<commit_message>
New Pubs Edit 9-24-19
</commit_message>
<xml_diff>
--- a/811M-Ch01_ToolsetOverview.pptx
+++ b/811M-Ch01_ToolsetOverview.pptx
@@ -15391,12 +15391,17 @@
 </file>
 
 <file path=customXml/item1.xml><?xml version="1.0" encoding="utf-8"?>
-<?mso-contentType ?>
-<FormTemplates xmlns="http://schemas.microsoft.com/sharepoint/v3/contenttype/forms">
-  <Display>DocumentLibraryForm</Display>
-  <Edit>DocumentLibraryForm</Edit>
-  <New>DocumentLibraryForm</New>
-</FormTemplates>
+<p:properties xmlns:p="http://schemas.microsoft.com/office/2006/metadata/properties" xmlns:xsi="http://www.w3.org/2001/XMLSchema-instance" xmlns:pc="http://schemas.microsoft.com/office/infopath/2007/PartnerControls">
+  <documentManagement>
+    <_dlc_DocId xmlns="037063e9-a85e-4c78-8627-f1a9315663e5">EVEA5JW6U4JV-6-9956</_dlc_DocId>
+    <_dlc_DocIdUrl xmlns="037063e9-a85e-4c78-8627-f1a9315663e5">
+      <Url>https://portal.roitraining.com/Courses/_layouts/DocIdRedir.aspx?ID=EVEA5JW6U4JV-6-9956</Url>
+      <Description>EVEA5JW6U4JV-6-9956</Description>
+    </_dlc_DocIdUrl>
+    <Date_x0020_last_x0020_used xmlns="027ed24f-5970-4294-be5c-0919c5aaa214" xsi:nil="true"/>
+    <Customization_x0020_Information xmlns="027ed24f-5970-4294-be5c-0919c5aaa214" xsi:nil="true"/>
+  </documentManagement>
+</p:properties>
 </file>
 
 <file path=customXml/item2.xml><?xml version="1.0" encoding="utf-8"?>
@@ -15566,17 +15571,12 @@
 </file>
 
 <file path=customXml/item3.xml><?xml version="1.0" encoding="utf-8"?>
-<p:properties xmlns:p="http://schemas.microsoft.com/office/2006/metadata/properties" xmlns:xsi="http://www.w3.org/2001/XMLSchema-instance" xmlns:pc="http://schemas.microsoft.com/office/infopath/2007/PartnerControls">
-  <documentManagement>
-    <_dlc_DocId xmlns="037063e9-a85e-4c78-8627-f1a9315663e5">EVEA5JW6U4JV-6-9956</_dlc_DocId>
-    <_dlc_DocIdUrl xmlns="037063e9-a85e-4c78-8627-f1a9315663e5">
-      <Url>https://portal.roitraining.com/Courses/_layouts/DocIdRedir.aspx?ID=EVEA5JW6U4JV-6-9956</Url>
-      <Description>EVEA5JW6U4JV-6-9956</Description>
-    </_dlc_DocIdUrl>
-    <Date_x0020_last_x0020_used xmlns="027ed24f-5970-4294-be5c-0919c5aaa214" xsi:nil="true"/>
-    <Customization_x0020_Information xmlns="027ed24f-5970-4294-be5c-0919c5aaa214" xsi:nil="true"/>
-  </documentManagement>
-</p:properties>
+<?mso-contentType ?>
+<FormTemplates xmlns="http://schemas.microsoft.com/sharepoint/v3/contenttype/forms">
+  <Display>DocumentLibraryForm</Display>
+  <Edit>DocumentLibraryForm</Edit>
+  <New>DocumentLibraryForm</New>
+</FormTemplates>
 </file>
 
 <file path=customXml/item4.xml><?xml version="1.0" encoding="utf-8"?>
@@ -15626,9 +15626,18 @@
 </file>
 
 <file path=customXml/itemProps1.xml><?xml version="1.0" encoding="utf-8"?>
-<ds:datastoreItem xmlns:ds="http://schemas.openxmlformats.org/officeDocument/2006/customXml" ds:itemID="{2DA015F3-603C-4688-A5F3-81D587DAB8C9}">
+<ds:datastoreItem xmlns:ds="http://schemas.openxmlformats.org/officeDocument/2006/customXml" ds:itemID="{F47B9207-CE5C-49AD-B414-15CBFA246D65}">
   <ds:schemaRefs>
-    <ds:schemaRef ds:uri="http://schemas.microsoft.com/sharepoint/v3/contenttype/forms"/>
+    <ds:schemaRef ds:uri="http://purl.org/dc/terms/"/>
+    <ds:schemaRef ds:uri="http://schemas.microsoft.com/office/2006/metadata/properties"/>
+    <ds:schemaRef ds:uri="http://schemas.microsoft.com/office/2006/documentManagement/types"/>
+    <ds:schemaRef ds:uri="http://purl.org/dc/elements/1.1/"/>
+    <ds:schemaRef ds:uri="037063e9-a85e-4c78-8627-f1a9315663e5"/>
+    <ds:schemaRef ds:uri="http://www.w3.org/XML/1998/namespace"/>
+    <ds:schemaRef ds:uri="http://schemas.microsoft.com/office/infopath/2007/PartnerControls"/>
+    <ds:schemaRef ds:uri="http://schemas.openxmlformats.org/package/2006/metadata/core-properties"/>
+    <ds:schemaRef ds:uri="027ed24f-5970-4294-be5c-0919c5aaa214"/>
+    <ds:schemaRef ds:uri="http://purl.org/dc/dcmitype/"/>
   </ds:schemaRefs>
 </ds:datastoreItem>
 </file>
@@ -15653,12 +15662,9 @@
 </file>
 
 <file path=customXml/itemProps3.xml><?xml version="1.0" encoding="utf-8"?>
-<ds:datastoreItem xmlns:ds="http://schemas.openxmlformats.org/officeDocument/2006/customXml" ds:itemID="{F47B9207-CE5C-49AD-B414-15CBFA246D65}">
+<ds:datastoreItem xmlns:ds="http://schemas.openxmlformats.org/officeDocument/2006/customXml" ds:itemID="{2DA015F3-603C-4688-A5F3-81D587DAB8C9}">
   <ds:schemaRefs>
-    <ds:schemaRef ds:uri="http://schemas.microsoft.com/office/2006/metadata/properties"/>
-    <ds:schemaRef ds:uri="http://schemas.microsoft.com/office/infopath/2007/PartnerControls"/>
-    <ds:schemaRef ds:uri="037063e9-a85e-4c78-8627-f1a9315663e5"/>
-    <ds:schemaRef ds:uri="027ed24f-5970-4294-be5c-0919c5aaa214"/>
+    <ds:schemaRef ds:uri="http://schemas.microsoft.com/sharepoint/v3/contenttype/forms"/>
   </ds:schemaRefs>
 </ds:datastoreItem>
 </file>

</xml_diff>